<commit_message>
checkpoint - pipeline fixed, 200k inference submitted to alice
</commit_message>
<xml_diff>
--- a/Thesis progress.pptx
+++ b/Thesis progress.pptx
@@ -11,6 +11,7 @@
     <p:sldId id="259" r:id="rId5"/>
     <p:sldId id="261" r:id="rId6"/>
     <p:sldId id="260" r:id="rId7"/>
+    <p:sldId id="262" r:id="rId8"/>
   </p:sldIdLst>
   <p:sldSz cx="12192000" cy="6858000"/>
   <p:notesSz cx="6858000" cy="9144000"/>
@@ -264,7 +265,7 @@
           <a:p>
             <a:fld id="{77ABA426-E705-2549-B78D-1219DDA9CF5C}" type="datetimeFigureOut">
               <a:rPr lang="en-US" smtClean="0"/>
-              <a:t>3/15/24</a:t>
+              <a:t>6/11/2024</a:t>
             </a:fld>
             <a:endParaRPr lang="en-US"/>
           </a:p>
@@ -462,7 +463,7 @@
           <a:p>
             <a:fld id="{77ABA426-E705-2549-B78D-1219DDA9CF5C}" type="datetimeFigureOut">
               <a:rPr lang="en-US" smtClean="0"/>
-              <a:t>3/15/24</a:t>
+              <a:t>6/11/2024</a:t>
             </a:fld>
             <a:endParaRPr lang="en-US"/>
           </a:p>
@@ -670,7 +671,7 @@
           <a:p>
             <a:fld id="{77ABA426-E705-2549-B78D-1219DDA9CF5C}" type="datetimeFigureOut">
               <a:rPr lang="en-US" smtClean="0"/>
-              <a:t>3/15/24</a:t>
+              <a:t>6/11/2024</a:t>
             </a:fld>
             <a:endParaRPr lang="en-US"/>
           </a:p>
@@ -868,7 +869,7 @@
           <a:p>
             <a:fld id="{77ABA426-E705-2549-B78D-1219DDA9CF5C}" type="datetimeFigureOut">
               <a:rPr lang="en-US" smtClean="0"/>
-              <a:t>3/15/24</a:t>
+              <a:t>6/11/2024</a:t>
             </a:fld>
             <a:endParaRPr lang="en-US"/>
           </a:p>
@@ -1143,7 +1144,7 @@
           <a:p>
             <a:fld id="{77ABA426-E705-2549-B78D-1219DDA9CF5C}" type="datetimeFigureOut">
               <a:rPr lang="en-US" smtClean="0"/>
-              <a:t>3/15/24</a:t>
+              <a:t>6/11/2024</a:t>
             </a:fld>
             <a:endParaRPr lang="en-US"/>
           </a:p>
@@ -1408,7 +1409,7 @@
           <a:p>
             <a:fld id="{77ABA426-E705-2549-B78D-1219DDA9CF5C}" type="datetimeFigureOut">
               <a:rPr lang="en-US" smtClean="0"/>
-              <a:t>3/15/24</a:t>
+              <a:t>6/11/2024</a:t>
             </a:fld>
             <a:endParaRPr lang="en-US"/>
           </a:p>
@@ -1820,7 +1821,7 @@
           <a:p>
             <a:fld id="{77ABA426-E705-2549-B78D-1219DDA9CF5C}" type="datetimeFigureOut">
               <a:rPr lang="en-US" smtClean="0"/>
-              <a:t>3/15/24</a:t>
+              <a:t>6/11/2024</a:t>
             </a:fld>
             <a:endParaRPr lang="en-US"/>
           </a:p>
@@ -1961,7 +1962,7 @@
           <a:p>
             <a:fld id="{77ABA426-E705-2549-B78D-1219DDA9CF5C}" type="datetimeFigureOut">
               <a:rPr lang="en-US" smtClean="0"/>
-              <a:t>3/15/24</a:t>
+              <a:t>6/11/2024</a:t>
             </a:fld>
             <a:endParaRPr lang="en-US"/>
           </a:p>
@@ -2074,7 +2075,7 @@
           <a:p>
             <a:fld id="{77ABA426-E705-2549-B78D-1219DDA9CF5C}" type="datetimeFigureOut">
               <a:rPr lang="en-US" smtClean="0"/>
-              <a:t>3/15/24</a:t>
+              <a:t>6/11/2024</a:t>
             </a:fld>
             <a:endParaRPr lang="en-US"/>
           </a:p>
@@ -2385,7 +2386,7 @@
           <a:p>
             <a:fld id="{77ABA426-E705-2549-B78D-1219DDA9CF5C}" type="datetimeFigureOut">
               <a:rPr lang="en-US" smtClean="0"/>
-              <a:t>3/15/24</a:t>
+              <a:t>6/11/2024</a:t>
             </a:fld>
             <a:endParaRPr lang="en-US"/>
           </a:p>
@@ -2673,7 +2674,7 @@
           <a:p>
             <a:fld id="{77ABA426-E705-2549-B78D-1219DDA9CF5C}" type="datetimeFigureOut">
               <a:rPr lang="en-US" smtClean="0"/>
-              <a:t>3/15/24</a:t>
+              <a:t>6/11/2024</a:t>
             </a:fld>
             <a:endParaRPr lang="en-US"/>
           </a:p>
@@ -2914,7 +2915,7 @@
           <a:p>
             <a:fld id="{77ABA426-E705-2549-B78D-1219DDA9CF5C}" type="datetimeFigureOut">
               <a:rPr lang="en-US" smtClean="0"/>
-              <a:t>3/15/24</a:t>
+              <a:t>6/11/2024</a:t>
             </a:fld>
             <a:endParaRPr lang="en-US"/>
           </a:p>
@@ -4018,7 +4019,11 @@
           </a:p>
           <a:p>
             <a:r>
-              <a:rPr lang="en-US" dirty="0"/>
+              <a:rPr lang="en-US" dirty="0">
+                <a:highlight>
+                  <a:srgbClr val="FFFF00"/>
+                </a:highlight>
+              </a:rPr>
               <a:t>Training graph with losses</a:t>
             </a:r>
           </a:p>
@@ -4091,13 +4096,8 @@
             </a:pPr>
             <a:r>
               <a:rPr lang="en-US" sz="2800" dirty="0"/>
-              <a:t>Thesis structure outline </a:t>
-            </a:r>
-            <a:r>
-              <a:rPr lang="en-US" sz="2800"/>
-              <a:t>first – text later</a:t>
-            </a:r>
-            <a:endParaRPr lang="en-US" sz="2800" dirty="0"/>
+              <a:t>Thesis structure outline first – text later</a:t>
+            </a:r>
           </a:p>
         </p:txBody>
       </p:sp>
@@ -4194,6 +4194,232 @@
     <p:extLst>
       <p:ext uri="{BB962C8B-B14F-4D97-AF65-F5344CB8AC3E}">
         <p14:creationId xmlns:p14="http://schemas.microsoft.com/office/powerpoint/2010/main" val="3759769256"/>
+      </p:ext>
+    </p:extLst>
+  </p:cSld>
+  <p:clrMapOvr>
+    <a:masterClrMapping/>
+  </p:clrMapOvr>
+</p:sld>
+</file>
+
+<file path=ppt/slides/slide7.xml><?xml version="1.0" encoding="utf-8"?>
+<p:sld xmlns:a="http://schemas.openxmlformats.org/drawingml/2006/main" xmlns:r="http://schemas.openxmlformats.org/officeDocument/2006/relationships" xmlns:p="http://schemas.openxmlformats.org/presentationml/2006/main">
+  <p:cSld>
+    <p:spTree>
+      <p:nvGrpSpPr>
+        <p:cNvPr id="1" name=""/>
+        <p:cNvGrpSpPr/>
+        <p:nvPr/>
+      </p:nvGrpSpPr>
+      <p:grpSpPr>
+        <a:xfrm>
+          <a:off x="0" y="0"/>
+          <a:ext cx="0" cy="0"/>
+          <a:chOff x="0" y="0"/>
+          <a:chExt cx="0" cy="0"/>
+        </a:xfrm>
+      </p:grpSpPr>
+      <p:sp>
+        <p:nvSpPr>
+          <p:cNvPr id="2" name="Title 1">
+            <a:extLst>
+              <a:ext uri="{FF2B5EF4-FFF2-40B4-BE49-F238E27FC236}">
+                <a16:creationId xmlns:a16="http://schemas.microsoft.com/office/drawing/2014/main" id="{27D78738-789B-75D4-8DC2-A9E33BCDABA7}"/>
+              </a:ext>
+            </a:extLst>
+          </p:cNvPr>
+          <p:cNvSpPr>
+            <a:spLocks noGrp="1"/>
+          </p:cNvSpPr>
+          <p:nvPr>
+            <p:ph type="title"/>
+          </p:nvPr>
+        </p:nvSpPr>
+        <p:spPr/>
+        <p:txBody>
+          <a:bodyPr/>
+          <a:lstStyle/>
+          <a:p>
+            <a:r>
+              <a:rPr lang="en-US" dirty="0"/>
+              <a:t>Current Progress 6-11</a:t>
+            </a:r>
+          </a:p>
+        </p:txBody>
+      </p:sp>
+      <p:sp>
+        <p:nvSpPr>
+          <p:cNvPr id="3" name="Content Placeholder 2">
+            <a:extLst>
+              <a:ext uri="{FF2B5EF4-FFF2-40B4-BE49-F238E27FC236}">
+                <a16:creationId xmlns:a16="http://schemas.microsoft.com/office/drawing/2014/main" id="{2BF0E02A-DEA3-15D7-78C4-08DD0DADCDD3}"/>
+              </a:ext>
+            </a:extLst>
+          </p:cNvPr>
+          <p:cNvSpPr>
+            <a:spLocks noGrp="1"/>
+          </p:cNvSpPr>
+          <p:nvPr>
+            <p:ph idx="1"/>
+          </p:nvPr>
+        </p:nvSpPr>
+        <p:spPr/>
+        <p:txBody>
+          <a:bodyPr>
+            <a:normAutofit fontScale="92500" lnSpcReduction="10000"/>
+          </a:bodyPr>
+          <a:lstStyle/>
+          <a:p>
+            <a:r>
+              <a:rPr lang="en-US" dirty="0"/>
+              <a:t>Experiment </a:t>
+            </a:r>
+          </a:p>
+          <a:p>
+            <a:pPr lvl="2"/>
+            <a:r>
+              <a:rPr lang="en-US" dirty="0"/>
+              <a:t>Universal train/test (80-20)</a:t>
+            </a:r>
+          </a:p>
+          <a:p>
+            <a:pPr lvl="2"/>
+            <a:r>
+              <a:rPr lang="en-US" dirty="0"/>
+              <a:t>Model save/load for both </a:t>
+            </a:r>
+            <a:r>
+              <a:rPr lang="en-US" dirty="0" err="1"/>
+              <a:t>xgB</a:t>
+            </a:r>
+            <a:r>
+              <a:rPr lang="en-US" dirty="0"/>
+              <a:t> and GNN</a:t>
+            </a:r>
+          </a:p>
+          <a:p>
+            <a:pPr lvl="2"/>
+            <a:r>
+              <a:rPr lang="en-US" dirty="0"/>
+              <a:t>1-click, 4 experiments (</a:t>
+            </a:r>
+            <a:r>
+              <a:rPr lang="en-US" dirty="0" err="1"/>
+              <a:t>xgB</a:t>
+            </a:r>
+            <a:r>
+              <a:rPr lang="en-US" dirty="0"/>
+              <a:t> and GNN for both 1k and 50k)</a:t>
+            </a:r>
+          </a:p>
+          <a:p>
+            <a:pPr lvl="2"/>
+            <a:r>
+              <a:rPr lang="en-US" dirty="0"/>
+              <a:t>200k inference running on ALICE </a:t>
+            </a:r>
+            <a:r>
+              <a:rPr lang="en-US" dirty="0">
+                <a:highlight>
+                  <a:srgbClr val="FFFF00"/>
+                </a:highlight>
+              </a:rPr>
+              <a:t>ongoing</a:t>
+            </a:r>
+          </a:p>
+          <a:p>
+            <a:pPr lvl="2"/>
+            <a:r>
+              <a:rPr lang="en-US" dirty="0"/>
+              <a:t>Graph and metrics </a:t>
+            </a:r>
+            <a:r>
+              <a:rPr lang="en-US" dirty="0">
+                <a:highlight>
+                  <a:srgbClr val="FFFF00"/>
+                </a:highlight>
+              </a:rPr>
+              <a:t>ongoing</a:t>
+            </a:r>
+            <a:r>
+              <a:rPr lang="en-US" dirty="0"/>
+              <a:t> </a:t>
+            </a:r>
+          </a:p>
+          <a:p>
+            <a:pPr lvl="2"/>
+            <a:endParaRPr lang="en-US" dirty="0"/>
+          </a:p>
+          <a:p>
+            <a:pPr marL="228600" lvl="2">
+              <a:spcBef>
+                <a:spcPts val="1000"/>
+              </a:spcBef>
+            </a:pPr>
+            <a:r>
+              <a:rPr lang="en-US" sz="2800" dirty="0"/>
+              <a:t>Thesis outline done – feedback?</a:t>
+            </a:r>
+          </a:p>
+          <a:p>
+            <a:pPr marL="228600" lvl="2">
+              <a:spcBef>
+                <a:spcPts val="1000"/>
+              </a:spcBef>
+            </a:pPr>
+            <a:r>
+              <a:rPr lang="en-US" sz="2800" dirty="0"/>
+              <a:t>Timeline discussion</a:t>
+            </a:r>
+          </a:p>
+          <a:p>
+            <a:pPr marL="685800" lvl="3">
+              <a:spcBef>
+                <a:spcPts val="1000"/>
+              </a:spcBef>
+            </a:pPr>
+            <a:r>
+              <a:rPr lang="en-US" sz="2600" dirty="0"/>
+              <a:t>1</a:t>
+            </a:r>
+            <a:r>
+              <a:rPr lang="en-US" sz="2600" baseline="30000" dirty="0"/>
+              <a:t>st</a:t>
+            </a:r>
+            <a:r>
+              <a:rPr lang="en-US" sz="2600" dirty="0"/>
+              <a:t> draft</a:t>
+            </a:r>
+          </a:p>
+          <a:p>
+            <a:pPr marL="685800" lvl="3">
+              <a:spcBef>
+                <a:spcPts val="1000"/>
+              </a:spcBef>
+            </a:pPr>
+            <a:r>
+              <a:rPr lang="en-US" sz="2600" dirty="0"/>
+              <a:t>Presentation to Alan/Mike</a:t>
+            </a:r>
+          </a:p>
+          <a:p>
+            <a:pPr marL="685800" lvl="3">
+              <a:spcBef>
+                <a:spcPts val="1000"/>
+              </a:spcBef>
+            </a:pPr>
+            <a:r>
+              <a:rPr lang="en-US" sz="2600" dirty="0"/>
+              <a:t>Final Draft</a:t>
+            </a:r>
+          </a:p>
+        </p:txBody>
+      </p:sp>
+    </p:spTree>
+    <p:extLst>
+      <p:ext uri="{BB962C8B-B14F-4D97-AF65-F5344CB8AC3E}">
+        <p14:creationId xmlns:p14="http://schemas.microsoft.com/office/powerpoint/2010/main" val="2749403412"/>
       </p:ext>
     </p:extLst>
   </p:cSld>

</xml_diff>